<commit_message>
Completed Creating recipe from scratch
</commit_message>
<xml_diff>
--- a/RDB. Create a recipe from scratch.pptx
+++ b/RDB. Create a recipe from scratch.pptx
@@ -11,7 +11,11 @@
     <p:sldId id="259" r:id="rId5"/>
     <p:sldId id="260" r:id="rId6"/>
     <p:sldId id="262" r:id="rId7"/>
-    <p:sldId id="263" r:id="rId8"/>
+    <p:sldId id="267" r:id="rId8"/>
+    <p:sldId id="263" r:id="rId9"/>
+    <p:sldId id="264" r:id="rId10"/>
+    <p:sldId id="265" r:id="rId11"/>
+    <p:sldId id="266" r:id="rId12"/>
   </p:sldIdLst>
   <p:sldSz cx="12192000" cy="6858000"/>
   <p:notesSz cx="6858000" cy="9144000"/>
@@ -3043,6 +3047,667 @@
 </p:sld>
 </file>
 
+<file path=ppt/slides/slide10.xml><?xml version="1.0" encoding="utf-8"?>
+<p:sld xmlns:a="http://schemas.openxmlformats.org/drawingml/2006/main" xmlns:r="http://schemas.openxmlformats.org/officeDocument/2006/relationships" xmlns:p="http://schemas.openxmlformats.org/presentationml/2006/main">
+  <p:cSld>
+    <p:spTree>
+      <p:nvGrpSpPr>
+        <p:cNvPr id="1" name=""/>
+        <p:cNvGrpSpPr/>
+        <p:nvPr/>
+      </p:nvGrpSpPr>
+      <p:grpSpPr>
+        <a:xfrm>
+          <a:off x="0" y="0"/>
+          <a:ext cx="0" cy="0"/>
+          <a:chOff x="0" y="0"/>
+          <a:chExt cx="0" cy="0"/>
+        </a:xfrm>
+      </p:grpSpPr>
+      <p:sp>
+        <p:nvSpPr>
+          <p:cNvPr id="2" name="Title 1"/>
+          <p:cNvSpPr>
+            <a:spLocks noGrp="1"/>
+          </p:cNvSpPr>
+          <p:nvPr>
+            <p:ph type="title"/>
+          </p:nvPr>
+        </p:nvSpPr>
+        <p:spPr>
+          <a:xfrm>
+            <a:off x="838200" y="365126"/>
+            <a:ext cx="10515600" cy="642408"/>
+          </a:xfrm>
+        </p:spPr>
+        <p:txBody>
+          <a:bodyPr>
+            <a:normAutofit/>
+          </a:bodyPr>
+          <a:lstStyle/>
+          <a:p>
+            <a:r>
+              <a:rPr lang="en-US" sz="3600" dirty="0" smtClean="0"/>
+              <a:t>Step 7. </a:t>
+            </a:r>
+            <a:r>
+              <a:rPr lang="en-US" sz="3600" dirty="0" smtClean="0">
+                <a:solidFill>
+                  <a:srgbClr val="00B050"/>
+                </a:solidFill>
+              </a:rPr>
+              <a:t>Matches, Serving Tips</a:t>
+            </a:r>
+            <a:endParaRPr lang="uk-UA" sz="3600" dirty="0">
+              <a:solidFill>
+                <a:srgbClr val="00B050"/>
+              </a:solidFill>
+            </a:endParaRPr>
+          </a:p>
+        </p:txBody>
+      </p:sp>
+      <p:sp>
+        <p:nvSpPr>
+          <p:cNvPr id="3" name="Content Placeholder 2"/>
+          <p:cNvSpPr>
+            <a:spLocks noGrp="1"/>
+          </p:cNvSpPr>
+          <p:nvPr>
+            <p:ph sz="half" idx="1"/>
+          </p:nvPr>
+        </p:nvSpPr>
+        <p:spPr>
+          <a:xfrm>
+            <a:off x="838200" y="1007534"/>
+            <a:ext cx="5181600" cy="5528733"/>
+          </a:xfrm>
+        </p:spPr>
+        <p:txBody>
+          <a:bodyPr>
+            <a:normAutofit/>
+          </a:bodyPr>
+          <a:lstStyle/>
+          <a:p>
+            <a:pPr marL="0" indent="0">
+              <a:buNone/>
+            </a:pPr>
+            <a:r>
+              <a:rPr lang="en-US" sz="1700" dirty="0" smtClean="0"/>
+              <a:t>In </a:t>
+            </a:r>
+            <a:r>
+              <a:rPr lang="en-US" sz="1700" dirty="0" smtClean="0">
+                <a:solidFill>
+                  <a:srgbClr val="00B050"/>
+                </a:solidFill>
+              </a:rPr>
+              <a:t>Matches</a:t>
+            </a:r>
+            <a:r>
+              <a:rPr lang="en-US" sz="1700" dirty="0" smtClean="0"/>
+              <a:t> section specify the Type of wine that matches the recipe and the Grape. This data is used in Menu builder functionality.</a:t>
+            </a:r>
+          </a:p>
+          <a:p>
+            <a:pPr marL="0" indent="0">
+              <a:buNone/>
+            </a:pPr>
+            <a:endParaRPr lang="en-US" sz="1600" dirty="0" smtClean="0"/>
+          </a:p>
+          <a:p>
+            <a:pPr marL="0" indent="0">
+              <a:buNone/>
+            </a:pPr>
+            <a:endParaRPr lang="en-US" sz="1600" dirty="0" smtClean="0"/>
+          </a:p>
+          <a:p>
+            <a:pPr marL="0" indent="0">
+              <a:buNone/>
+            </a:pPr>
+            <a:endParaRPr lang="en-US" sz="1600" dirty="0"/>
+          </a:p>
+          <a:p>
+            <a:pPr marL="0" indent="0">
+              <a:buNone/>
+            </a:pPr>
+            <a:endParaRPr lang="en-US" sz="1600" dirty="0" smtClean="0"/>
+          </a:p>
+          <a:p>
+            <a:pPr marL="0" indent="0">
+              <a:buNone/>
+            </a:pPr>
+            <a:endParaRPr lang="en-US" sz="1600" dirty="0"/>
+          </a:p>
+          <a:p>
+            <a:pPr marL="0" indent="0">
+              <a:buNone/>
+            </a:pPr>
+            <a:endParaRPr lang="en-US" sz="1600" dirty="0" smtClean="0"/>
+          </a:p>
+          <a:p>
+            <a:pPr marL="0" indent="0">
+              <a:buNone/>
+            </a:pPr>
+            <a:endParaRPr lang="en-US" sz="1600" dirty="0"/>
+          </a:p>
+          <a:p>
+            <a:pPr marL="0" indent="0">
+              <a:buNone/>
+            </a:pPr>
+            <a:endParaRPr lang="en-US" sz="1600" dirty="0" smtClean="0"/>
+          </a:p>
+          <a:p>
+            <a:pPr marL="0" indent="0">
+              <a:buNone/>
+            </a:pPr>
+            <a:endParaRPr lang="en-US" sz="1600" dirty="0"/>
+          </a:p>
+          <a:p>
+            <a:pPr marL="0" indent="0">
+              <a:buNone/>
+            </a:pPr>
+            <a:endParaRPr lang="en-US" sz="1600" dirty="0" smtClean="0"/>
+          </a:p>
+          <a:p>
+            <a:pPr marL="0" indent="0">
+              <a:buNone/>
+            </a:pPr>
+            <a:r>
+              <a:rPr lang="en-US" sz="1600" dirty="0" smtClean="0"/>
+              <a:t>Don’t forget to </a:t>
+            </a:r>
+            <a:r>
+              <a:rPr lang="en-US" sz="1700" dirty="0" smtClean="0">
+                <a:solidFill>
+                  <a:srgbClr val="00B050"/>
+                </a:solidFill>
+              </a:rPr>
+              <a:t>Save</a:t>
+            </a:r>
+            <a:r>
+              <a:rPr lang="en-US" sz="1600" dirty="0" smtClean="0"/>
+              <a:t> your changes.</a:t>
+            </a:r>
+          </a:p>
+          <a:p>
+            <a:pPr marL="0" indent="0">
+              <a:buNone/>
+            </a:pPr>
+            <a:endParaRPr lang="uk-UA" sz="1600" dirty="0"/>
+          </a:p>
+        </p:txBody>
+      </p:sp>
+      <p:sp>
+        <p:nvSpPr>
+          <p:cNvPr id="4" name="Content Placeholder 3"/>
+          <p:cNvSpPr>
+            <a:spLocks noGrp="1"/>
+          </p:cNvSpPr>
+          <p:nvPr>
+            <p:ph sz="half" idx="2"/>
+          </p:nvPr>
+        </p:nvSpPr>
+        <p:spPr>
+          <a:xfrm>
+            <a:off x="6172200" y="1007534"/>
+            <a:ext cx="5181600" cy="5169429"/>
+          </a:xfrm>
+        </p:spPr>
+        <p:txBody>
+          <a:bodyPr>
+            <a:normAutofit/>
+          </a:bodyPr>
+          <a:lstStyle/>
+          <a:p>
+            <a:pPr marL="0" indent="0">
+              <a:buNone/>
+            </a:pPr>
+            <a:r>
+              <a:rPr lang="en-US" sz="1700" dirty="0" smtClean="0"/>
+              <a:t>In </a:t>
+            </a:r>
+            <a:r>
+              <a:rPr lang="en-US" sz="1700" dirty="0" smtClean="0">
+                <a:solidFill>
+                  <a:srgbClr val="00B050"/>
+                </a:solidFill>
+              </a:rPr>
+              <a:t>Tips</a:t>
+            </a:r>
+            <a:r>
+              <a:rPr lang="en-US" sz="1700" dirty="0" smtClean="0"/>
+              <a:t> section put the Tips and Tricks for preparation the dish.</a:t>
+            </a:r>
+          </a:p>
+          <a:p>
+            <a:pPr marL="0" indent="0">
+              <a:buNone/>
+            </a:pPr>
+            <a:r>
+              <a:rPr lang="en-US" sz="1700" b="1" dirty="0" smtClean="0"/>
+              <a:t>Important</a:t>
+            </a:r>
+            <a:r>
+              <a:rPr lang="en-US" sz="1700" dirty="0" smtClean="0"/>
+              <a:t>: even though editor is not restricted in number of Tips groups, never the less only the first Tips group will be shown on the Recipe page.</a:t>
+            </a:r>
+          </a:p>
+          <a:p>
+            <a:pPr marL="0" indent="0">
+              <a:buNone/>
+            </a:pPr>
+            <a:endParaRPr lang="uk-UA" sz="1600" dirty="0"/>
+          </a:p>
+        </p:txBody>
+      </p:sp>
+      <p:pic>
+        <p:nvPicPr>
+          <p:cNvPr id="5" name="Picture 4"/>
+          <p:cNvPicPr>
+            <a:picLocks noChangeAspect="1"/>
+          </p:cNvPicPr>
+          <p:nvPr/>
+        </p:nvPicPr>
+        <p:blipFill>
+          <a:blip r:embed="rId2"/>
+          <a:stretch>
+            <a:fillRect/>
+          </a:stretch>
+        </p:blipFill>
+        <p:spPr>
+          <a:xfrm>
+            <a:off x="545000" y="1997045"/>
+            <a:ext cx="5550999" cy="2828954"/>
+          </a:xfrm>
+          <a:prstGeom prst="rect">
+            <a:avLst/>
+          </a:prstGeom>
+          <a:ln>
+            <a:noFill/>
+          </a:ln>
+          <a:effectLst>
+            <a:outerShdw blurRad="292100" dist="139700" dir="2700000" algn="tl" rotWithShape="0">
+              <a:srgbClr val="333333">
+                <a:alpha val="65000"/>
+              </a:srgbClr>
+            </a:outerShdw>
+          </a:effectLst>
+        </p:spPr>
+      </p:pic>
+      <p:pic>
+        <p:nvPicPr>
+          <p:cNvPr id="6" name="Picture 5"/>
+          <p:cNvPicPr>
+            <a:picLocks noChangeAspect="1"/>
+          </p:cNvPicPr>
+          <p:nvPr/>
+        </p:nvPicPr>
+        <p:blipFill>
+          <a:blip r:embed="rId3"/>
+          <a:stretch>
+            <a:fillRect/>
+          </a:stretch>
+        </p:blipFill>
+        <p:spPr>
+          <a:xfrm>
+            <a:off x="6312028" y="2809845"/>
+            <a:ext cx="5117973" cy="2828954"/>
+          </a:xfrm>
+          <a:prstGeom prst="rect">
+            <a:avLst/>
+          </a:prstGeom>
+          <a:ln>
+            <a:noFill/>
+          </a:ln>
+          <a:effectLst>
+            <a:outerShdw blurRad="292100" dist="139700" dir="2700000" algn="tl" rotWithShape="0">
+              <a:srgbClr val="333333">
+                <a:alpha val="65000"/>
+              </a:srgbClr>
+            </a:outerShdw>
+          </a:effectLst>
+        </p:spPr>
+      </p:pic>
+    </p:spTree>
+    <p:extLst>
+      <p:ext uri="{BB962C8B-B14F-4D97-AF65-F5344CB8AC3E}">
+        <p14:creationId xmlns:p14="http://schemas.microsoft.com/office/powerpoint/2010/main" val="3649972697"/>
+      </p:ext>
+    </p:extLst>
+  </p:cSld>
+  <p:clrMapOvr>
+    <a:masterClrMapping/>
+  </p:clrMapOvr>
+  <p:timing>
+    <p:tnLst>
+      <p:par>
+        <p:cTn id="1" dur="indefinite" restart="never" nodeType="tmRoot"/>
+      </p:par>
+    </p:tnLst>
+  </p:timing>
+</p:sld>
+</file>
+
+<file path=ppt/slides/slide11.xml><?xml version="1.0" encoding="utf-8"?>
+<p:sld xmlns:a="http://schemas.openxmlformats.org/drawingml/2006/main" xmlns:r="http://schemas.openxmlformats.org/officeDocument/2006/relationships" xmlns:p="http://schemas.openxmlformats.org/presentationml/2006/main">
+  <p:cSld>
+    <p:spTree>
+      <p:nvGrpSpPr>
+        <p:cNvPr id="1" name=""/>
+        <p:cNvGrpSpPr/>
+        <p:nvPr/>
+      </p:nvGrpSpPr>
+      <p:grpSpPr>
+        <a:xfrm>
+          <a:off x="0" y="0"/>
+          <a:ext cx="0" cy="0"/>
+          <a:chOff x="0" y="0"/>
+          <a:chExt cx="0" cy="0"/>
+        </a:xfrm>
+      </p:grpSpPr>
+      <p:sp>
+        <p:nvSpPr>
+          <p:cNvPr id="2" name="Title 1"/>
+          <p:cNvSpPr>
+            <a:spLocks noGrp="1"/>
+          </p:cNvSpPr>
+          <p:nvPr>
+            <p:ph type="title"/>
+          </p:nvPr>
+        </p:nvSpPr>
+        <p:spPr>
+          <a:xfrm>
+            <a:off x="838200" y="365125"/>
+            <a:ext cx="10515600" cy="701675"/>
+          </a:xfrm>
+        </p:spPr>
+        <p:txBody>
+          <a:bodyPr>
+            <a:normAutofit/>
+          </a:bodyPr>
+          <a:lstStyle/>
+          <a:p>
+            <a:r>
+              <a:rPr lang="en-US" sz="3600" dirty="0" smtClean="0"/>
+              <a:t>Step 8. Add recipe to existing project and Publish</a:t>
+            </a:r>
+            <a:endParaRPr lang="uk-UA" sz="3600" dirty="0"/>
+          </a:p>
+        </p:txBody>
+      </p:sp>
+      <p:sp>
+        <p:nvSpPr>
+          <p:cNvPr id="3" name="Content Placeholder 2"/>
+          <p:cNvSpPr>
+            <a:spLocks noGrp="1"/>
+          </p:cNvSpPr>
+          <p:nvPr>
+            <p:ph sz="half" idx="1"/>
+          </p:nvPr>
+        </p:nvSpPr>
+        <p:spPr>
+          <a:xfrm>
+            <a:off x="838200" y="1066800"/>
+            <a:ext cx="5181600" cy="5110163"/>
+          </a:xfrm>
+        </p:spPr>
+        <p:txBody>
+          <a:bodyPr>
+            <a:normAutofit/>
+          </a:bodyPr>
+          <a:lstStyle/>
+          <a:p>
+            <a:r>
+              <a:rPr lang="en-US" sz="1600" dirty="0" smtClean="0"/>
+              <a:t>When all the data is in place and the recipe is ready to be published, meaning shown on the website, we need to add it to existing project called </a:t>
+            </a:r>
+            <a:r>
+              <a:rPr lang="en-US" sz="1600" b="1" dirty="0" smtClean="0"/>
+              <a:t>Web.</a:t>
+            </a:r>
+          </a:p>
+          <a:p>
+            <a:r>
+              <a:rPr lang="en-US" sz="1600" dirty="0" smtClean="0"/>
+              <a:t>For that in the sticky </a:t>
+            </a:r>
+            <a:r>
+              <a:rPr lang="en-US" sz="1600" dirty="0" smtClean="0">
+                <a:solidFill>
+                  <a:srgbClr val="00B050"/>
+                </a:solidFill>
+              </a:rPr>
+              <a:t>main menu</a:t>
+            </a:r>
+            <a:r>
+              <a:rPr lang="en-US" sz="1600" dirty="0" smtClean="0"/>
+              <a:t> click on </a:t>
+            </a:r>
+            <a:r>
+              <a:rPr lang="en-US" sz="1600" dirty="0" smtClean="0">
+                <a:solidFill>
+                  <a:srgbClr val="00B050"/>
+                </a:solidFill>
+              </a:rPr>
+              <a:t>More </a:t>
+            </a:r>
+            <a:r>
+              <a:rPr lang="en-US" sz="1600" dirty="0" smtClean="0"/>
+              <a:t>and choose </a:t>
+            </a:r>
+            <a:r>
+              <a:rPr lang="en-US" sz="1600" dirty="0" smtClean="0">
+                <a:solidFill>
+                  <a:srgbClr val="00B050"/>
+                </a:solidFill>
+              </a:rPr>
+              <a:t>Add to existing project</a:t>
+            </a:r>
+          </a:p>
+          <a:p>
+            <a:pPr marL="0" indent="0">
+              <a:buNone/>
+            </a:pPr>
+            <a:endParaRPr lang="uk-UA" sz="1600" dirty="0">
+              <a:solidFill>
+                <a:srgbClr val="00B050"/>
+              </a:solidFill>
+            </a:endParaRPr>
+          </a:p>
+        </p:txBody>
+      </p:sp>
+      <p:sp>
+        <p:nvSpPr>
+          <p:cNvPr id="4" name="Content Placeholder 3"/>
+          <p:cNvSpPr>
+            <a:spLocks noGrp="1"/>
+          </p:cNvSpPr>
+          <p:nvPr>
+            <p:ph sz="half" idx="2"/>
+          </p:nvPr>
+        </p:nvSpPr>
+        <p:spPr>
+          <a:xfrm>
+            <a:off x="6172200" y="1066800"/>
+            <a:ext cx="5181600" cy="5110163"/>
+          </a:xfrm>
+        </p:spPr>
+        <p:txBody>
+          <a:bodyPr>
+            <a:normAutofit/>
+          </a:bodyPr>
+          <a:lstStyle/>
+          <a:p>
+            <a:pPr marL="0" indent="0">
+              <a:buNone/>
+            </a:pPr>
+            <a:r>
+              <a:rPr lang="en-US" sz="1600" dirty="0" smtClean="0"/>
+              <a:t>Right after the recipe was added to the project </a:t>
+            </a:r>
+            <a:r>
+              <a:rPr lang="en-US" sz="1600" b="1" dirty="0" smtClean="0"/>
+              <a:t>Web,</a:t>
+            </a:r>
+            <a:r>
+              <a:rPr lang="en-US" sz="1600" dirty="0" smtClean="0"/>
+              <a:t> go to the </a:t>
+            </a:r>
+            <a:r>
+              <a:rPr lang="en-US" sz="1600" dirty="0" smtClean="0">
+                <a:solidFill>
+                  <a:srgbClr val="00B050"/>
+                </a:solidFill>
+              </a:rPr>
+              <a:t>Recipe information</a:t>
+            </a:r>
+            <a:r>
+              <a:rPr lang="en-US" sz="1600" dirty="0" smtClean="0"/>
+              <a:t> section and change the recipe status from </a:t>
+            </a:r>
+            <a:r>
+              <a:rPr lang="en-US" sz="1600" dirty="0" smtClean="0">
+                <a:solidFill>
+                  <a:schemeClr val="accent2"/>
+                </a:solidFill>
+              </a:rPr>
+              <a:t>In progress</a:t>
+            </a:r>
+            <a:r>
+              <a:rPr lang="en-US" sz="1600" dirty="0" smtClean="0"/>
+              <a:t> to </a:t>
+            </a:r>
+            <a:r>
+              <a:rPr lang="en-US" sz="1600" b="1" dirty="0" smtClean="0">
+                <a:solidFill>
+                  <a:srgbClr val="00B050"/>
+                </a:solidFill>
+              </a:rPr>
+              <a:t>Finished</a:t>
+            </a:r>
+            <a:r>
+              <a:rPr lang="en-US" sz="1600" dirty="0" smtClean="0"/>
+              <a:t> and press </a:t>
+            </a:r>
+            <a:r>
+              <a:rPr lang="en-US" sz="1600" dirty="0" smtClean="0">
+                <a:solidFill>
+                  <a:srgbClr val="00B050"/>
+                </a:solidFill>
+              </a:rPr>
+              <a:t>Save</a:t>
+            </a:r>
+            <a:r>
+              <a:rPr lang="en-US" sz="1600" dirty="0" smtClean="0"/>
+              <a:t> button.</a:t>
+            </a:r>
+          </a:p>
+          <a:p>
+            <a:pPr marL="0" indent="0">
+              <a:buNone/>
+            </a:pPr>
+            <a:endParaRPr lang="en-US" sz="1600" dirty="0"/>
+          </a:p>
+          <a:p>
+            <a:pPr marL="0" indent="0">
+              <a:buNone/>
+            </a:pPr>
+            <a:r>
+              <a:rPr lang="en-US" sz="1600" dirty="0" smtClean="0"/>
+              <a:t>Well done! The recipe is completed and shown on the website.</a:t>
+            </a:r>
+            <a:endParaRPr lang="uk-UA" sz="1600" dirty="0"/>
+          </a:p>
+        </p:txBody>
+      </p:sp>
+      <p:pic>
+        <p:nvPicPr>
+          <p:cNvPr id="5" name="Picture 4"/>
+          <p:cNvPicPr>
+            <a:picLocks noChangeAspect="1"/>
+          </p:cNvPicPr>
+          <p:nvPr/>
+        </p:nvPicPr>
+        <p:blipFill>
+          <a:blip r:embed="rId2"/>
+          <a:stretch>
+            <a:fillRect/>
+          </a:stretch>
+        </p:blipFill>
+        <p:spPr>
+          <a:xfrm>
+            <a:off x="838200" y="2412731"/>
+            <a:ext cx="4614801" cy="2418299"/>
+          </a:xfrm>
+          <a:prstGeom prst="rect">
+            <a:avLst/>
+          </a:prstGeom>
+          <a:ln>
+            <a:noFill/>
+          </a:ln>
+          <a:effectLst>
+            <a:outerShdw blurRad="292100" dist="139700" dir="2700000" algn="tl" rotWithShape="0">
+              <a:srgbClr val="333333">
+                <a:alpha val="65000"/>
+              </a:srgbClr>
+            </a:outerShdw>
+          </a:effectLst>
+        </p:spPr>
+      </p:pic>
+      <p:pic>
+        <p:nvPicPr>
+          <p:cNvPr id="6" name="Picture 5"/>
+          <p:cNvPicPr>
+            <a:picLocks noChangeAspect="1"/>
+          </p:cNvPicPr>
+          <p:nvPr/>
+        </p:nvPicPr>
+        <p:blipFill>
+          <a:blip r:embed="rId3"/>
+          <a:stretch>
+            <a:fillRect/>
+          </a:stretch>
+        </p:blipFill>
+        <p:spPr>
+          <a:xfrm>
+            <a:off x="1188907" y="4998719"/>
+            <a:ext cx="3913385" cy="1453543"/>
+          </a:xfrm>
+          <a:prstGeom prst="rect">
+            <a:avLst/>
+          </a:prstGeom>
+          <a:ln>
+            <a:noFill/>
+          </a:ln>
+          <a:effectLst>
+            <a:outerShdw blurRad="292100" dist="139700" dir="2700000" algn="tl" rotWithShape="0">
+              <a:srgbClr val="333333">
+                <a:alpha val="65000"/>
+              </a:srgbClr>
+            </a:outerShdw>
+          </a:effectLst>
+        </p:spPr>
+      </p:pic>
+    </p:spTree>
+    <p:extLst>
+      <p:ext uri="{BB962C8B-B14F-4D97-AF65-F5344CB8AC3E}">
+        <p14:creationId xmlns:p14="http://schemas.microsoft.com/office/powerpoint/2010/main" val="2902763364"/>
+      </p:ext>
+    </p:extLst>
+  </p:cSld>
+  <p:clrMapOvr>
+    <a:masterClrMapping/>
+  </p:clrMapOvr>
+  <p:timing>
+    <p:tnLst>
+      <p:par>
+        <p:cTn id="1" dur="indefinite" restart="never" nodeType="tmRoot"/>
+      </p:par>
+    </p:tnLst>
+  </p:timing>
+</p:sld>
+</file>
+
 <file path=ppt/slides/slide2.xml><?xml version="1.0" encoding="utf-8"?>
 <p:sld xmlns:a="http://schemas.openxmlformats.org/drawingml/2006/main" xmlns:r="http://schemas.openxmlformats.org/officeDocument/2006/relationships" xmlns:p="http://schemas.openxmlformats.org/presentationml/2006/main">
   <p:cSld>
@@ -3564,15 +4229,7 @@
           <a:p>
             <a:r>
               <a:rPr lang="en-US" sz="3600" dirty="0" smtClean="0"/>
-              <a:t>Step 3. Create recipe </a:t>
-            </a:r>
-            <a:r>
-              <a:rPr lang="en-US" sz="3600" dirty="0" smtClean="0"/>
-              <a:t>basis entering </a:t>
-            </a:r>
-            <a:r>
-              <a:rPr lang="en-US" sz="3600" dirty="0" smtClean="0"/>
-              <a:t>minimum required data </a:t>
+              <a:t>Step 3. Create recipe basis entering minimum required data </a:t>
             </a:r>
             <a:endParaRPr lang="en-GB" sz="3600" dirty="0"/>
           </a:p>
@@ -4374,7 +5031,7 @@
         <p:spPr>
           <a:xfrm>
             <a:off x="838200" y="1182189"/>
-            <a:ext cx="5181600" cy="4994774"/>
+            <a:ext cx="4030980" cy="4994774"/>
           </a:xfrm>
         </p:spPr>
         <p:txBody>
@@ -4383,6 +5040,59 @@
           </a:bodyPr>
           <a:lstStyle/>
           <a:p>
+            <a:pPr marL="0" indent="0">
+              <a:buNone/>
+            </a:pPr>
+            <a:r>
+              <a:rPr lang="en-GB" sz="1600" dirty="0" smtClean="0"/>
+              <a:t>Specify which categories the recipe matches.</a:t>
+            </a:r>
+          </a:p>
+          <a:p>
+            <a:r>
+              <a:rPr lang="en-GB" sz="1600" i="1" dirty="0" smtClean="0"/>
+              <a:t>Occasion</a:t>
+            </a:r>
+            <a:r>
+              <a:rPr lang="en-GB" sz="1600" dirty="0" smtClean="0"/>
+              <a:t>, </a:t>
+            </a:r>
+            <a:r>
+              <a:rPr lang="en-GB" sz="1600" i="1" dirty="0" smtClean="0"/>
+              <a:t>Meal type</a:t>
+            </a:r>
+            <a:r>
+              <a:rPr lang="en-GB" sz="1600" dirty="0" smtClean="0"/>
+              <a:t> and </a:t>
+            </a:r>
+            <a:r>
+              <a:rPr lang="en-GB" sz="1600" i="1" dirty="0" smtClean="0"/>
+              <a:t>Cheese type</a:t>
+            </a:r>
+            <a:r>
+              <a:rPr lang="en-GB" sz="1600" dirty="0" smtClean="0"/>
+              <a:t> are used on the Recipe Overview page as a filters.</a:t>
+            </a:r>
+          </a:p>
+          <a:p>
+            <a:r>
+              <a:rPr lang="en-GB" sz="1600" dirty="0" smtClean="0"/>
+              <a:t>The rest of categories are used in Menu Builder functionality</a:t>
+            </a:r>
+          </a:p>
+          <a:p>
+            <a:r>
+              <a:rPr lang="en-GB" sz="1600" dirty="0" smtClean="0">
+                <a:solidFill>
+                  <a:srgbClr val="00B050"/>
+                </a:solidFill>
+              </a:rPr>
+              <a:t>Save</a:t>
+            </a:r>
+            <a:r>
+              <a:rPr lang="en-GB" sz="1600" dirty="0" smtClean="0"/>
+              <a:t> your changes.</a:t>
+            </a:r>
             <a:endParaRPr lang="en-GB" sz="1600" dirty="0"/>
           </a:p>
         </p:txBody>
@@ -4417,8 +5127,8 @@
         </p:blipFill>
         <p:spPr>
           <a:xfrm>
-            <a:off x="6095999" y="1182188"/>
-            <a:ext cx="5887188" cy="4304212"/>
+            <a:off x="4975858" y="1182189"/>
+            <a:ext cx="6831721" cy="4994774"/>
           </a:xfrm>
           <a:prstGeom prst="rect">
             <a:avLst/>
@@ -4482,12 +5192,23 @@
             <p:ph type="title"/>
           </p:nvPr>
         </p:nvSpPr>
-        <p:spPr/>
-        <p:txBody>
-          <a:bodyPr/>
-          <a:lstStyle/>
-          <a:p>
-            <a:endParaRPr lang="en-GB"/>
+        <p:spPr>
+          <a:xfrm>
+            <a:off x="321734" y="365126"/>
+            <a:ext cx="11032066" cy="650874"/>
+          </a:xfrm>
+        </p:spPr>
+        <p:txBody>
+          <a:bodyPr>
+            <a:normAutofit/>
+          </a:bodyPr>
+          <a:lstStyle/>
+          <a:p>
+            <a:r>
+              <a:rPr lang="en-US" sz="3600" dirty="0" smtClean="0"/>
+              <a:t>Menu builder tagging</a:t>
+            </a:r>
+            <a:endParaRPr lang="uk-UA" sz="3600" dirty="0"/>
           </a:p>
         </p:txBody>
       </p:sp>
@@ -4501,12 +5222,31 @@
             <p:ph sz="half" idx="1"/>
           </p:nvPr>
         </p:nvSpPr>
-        <p:spPr/>
-        <p:txBody>
-          <a:bodyPr/>
-          <a:lstStyle/>
-          <a:p>
-            <a:endParaRPr lang="en-GB"/>
+        <p:spPr>
+          <a:xfrm>
+            <a:off x="276584" y="999067"/>
+            <a:ext cx="4430883" cy="5160963"/>
+          </a:xfrm>
+        </p:spPr>
+        <p:txBody>
+          <a:bodyPr>
+            <a:normAutofit/>
+          </a:bodyPr>
+          <a:lstStyle/>
+          <a:p>
+            <a:pPr marL="0" indent="0">
+              <a:buNone/>
+            </a:pPr>
+            <a:r>
+              <a:rPr lang="en-US" sz="1600" dirty="0" smtClean="0"/>
+              <a:t>On the website the Menu Builder looks like this:</a:t>
+            </a:r>
+          </a:p>
+          <a:p>
+            <a:pPr marL="0" indent="0">
+              <a:buNone/>
+            </a:pPr>
+            <a:endParaRPr lang="uk-UA" sz="1600" dirty="0"/>
           </a:p>
         </p:txBody>
       </p:sp>
@@ -4520,19 +5260,905 @@
             <p:ph sz="half" idx="2"/>
           </p:nvPr>
         </p:nvSpPr>
-        <p:spPr/>
-        <p:txBody>
-          <a:bodyPr/>
-          <a:lstStyle/>
-          <a:p>
-            <a:endParaRPr lang="en-GB"/>
-          </a:p>
-        </p:txBody>
-      </p:sp>
+        <p:spPr>
+          <a:xfrm>
+            <a:off x="5164667" y="1016000"/>
+            <a:ext cx="6189133" cy="5160963"/>
+          </a:xfrm>
+        </p:spPr>
+        <p:txBody>
+          <a:bodyPr>
+            <a:normAutofit/>
+          </a:bodyPr>
+          <a:lstStyle/>
+          <a:p>
+            <a:pPr marL="0" indent="0">
+              <a:buNone/>
+            </a:pPr>
+            <a:r>
+              <a:rPr lang="en-US" sz="1600" dirty="0" smtClean="0"/>
+              <a:t>In </a:t>
+            </a:r>
+            <a:r>
+              <a:rPr lang="en-US" sz="1600" dirty="0" err="1" smtClean="0"/>
+              <a:t>Episerver</a:t>
+            </a:r>
+            <a:r>
+              <a:rPr lang="en-US" sz="1600" dirty="0" smtClean="0"/>
+              <a:t> it is building in the following way:</a:t>
+            </a:r>
+          </a:p>
+          <a:p>
+            <a:pPr marL="0" indent="0">
+              <a:buNone/>
+            </a:pPr>
+            <a:endParaRPr lang="en-US" sz="1600" dirty="0"/>
+          </a:p>
+          <a:p>
+            <a:pPr marL="0" indent="0">
+              <a:buNone/>
+            </a:pPr>
+            <a:r>
+              <a:rPr lang="en-US" sz="1600" dirty="0" smtClean="0"/>
+              <a:t>In the dropdowns editors can specify</a:t>
+            </a:r>
+            <a:br>
+              <a:rPr lang="en-US" sz="1600" dirty="0" smtClean="0"/>
+            </a:br>
+            <a:r>
+              <a:rPr lang="en-US" sz="1600" dirty="0" smtClean="0"/>
+              <a:t>the Occasion type, the Primary block </a:t>
+            </a:r>
+            <a:br>
+              <a:rPr lang="en-US" sz="1600" dirty="0" smtClean="0"/>
+            </a:br>
+            <a:r>
+              <a:rPr lang="en-US" sz="1600" dirty="0" smtClean="0"/>
+              <a:t>type and three secondary block </a:t>
+            </a:r>
+            <a:br>
+              <a:rPr lang="en-US" sz="1600" dirty="0" smtClean="0"/>
+            </a:br>
+            <a:r>
+              <a:rPr lang="en-US" sz="1600" dirty="0" smtClean="0"/>
+              <a:t>types. All the categories are taken </a:t>
+            </a:r>
+            <a:br>
+              <a:rPr lang="en-US" sz="1600" dirty="0" smtClean="0"/>
+            </a:br>
+            <a:r>
+              <a:rPr lang="en-US" sz="1600" dirty="0" smtClean="0"/>
+              <a:t>from RDB. </a:t>
+            </a:r>
+          </a:p>
+          <a:p>
+            <a:pPr marL="0" indent="0">
+              <a:buNone/>
+            </a:pPr>
+            <a:r>
+              <a:rPr lang="en-US" sz="1600" dirty="0" smtClean="0"/>
+              <a:t>The system automatically picks </a:t>
+            </a:r>
+            <a:br>
+              <a:rPr lang="en-US" sz="1600" dirty="0" smtClean="0"/>
+            </a:br>
+            <a:r>
+              <a:rPr lang="en-US" sz="1600" dirty="0" smtClean="0"/>
+              <a:t>from RDB the recipes with chosen</a:t>
+            </a:r>
+            <a:br>
+              <a:rPr lang="en-US" sz="1600" dirty="0" smtClean="0"/>
+            </a:br>
+            <a:r>
+              <a:rPr lang="en-US" sz="1600" dirty="0" smtClean="0"/>
+              <a:t>appropriate categories.</a:t>
+            </a:r>
+          </a:p>
+          <a:p>
+            <a:pPr marL="0" indent="0">
+              <a:buNone/>
+            </a:pPr>
+            <a:r>
+              <a:rPr lang="en-US" sz="1600" dirty="0" smtClean="0"/>
+              <a:t>So </a:t>
+            </a:r>
+            <a:r>
+              <a:rPr lang="en-US" sz="1600" dirty="0" err="1" smtClean="0"/>
+              <a:t>f.e</a:t>
+            </a:r>
+            <a:r>
+              <a:rPr lang="en-US" sz="1600" dirty="0" smtClean="0"/>
+              <a:t>. for Primary block there will be </a:t>
+            </a:r>
+            <a:br>
+              <a:rPr lang="en-US" sz="1600" dirty="0" smtClean="0"/>
+            </a:br>
+            <a:r>
+              <a:rPr lang="en-US" sz="1600" dirty="0" smtClean="0"/>
+              <a:t>represented recipes with chosen </a:t>
+            </a:r>
+            <a:br>
+              <a:rPr lang="en-US" sz="1600" dirty="0" smtClean="0"/>
+            </a:br>
+            <a:r>
+              <a:rPr lang="en-US" sz="1600" dirty="0" smtClean="0"/>
+              <a:t>Dinner Main Dish category. And for the</a:t>
+            </a:r>
+            <a:br>
+              <a:rPr lang="en-US" sz="1600" dirty="0" smtClean="0"/>
+            </a:br>
+            <a:r>
+              <a:rPr lang="en-US" sz="1600" dirty="0" smtClean="0"/>
+              <a:t>First (left) block it will be shown the </a:t>
+            </a:r>
+            <a:br>
+              <a:rPr lang="en-US" sz="1600" dirty="0" smtClean="0"/>
+            </a:br>
+            <a:r>
+              <a:rPr lang="en-US" sz="1600" dirty="0" smtClean="0"/>
+              <a:t>recipes with chosen Dinner Appetizer</a:t>
+            </a:r>
+            <a:br>
+              <a:rPr lang="en-US" sz="1600" dirty="0" smtClean="0"/>
+            </a:br>
+            <a:r>
+              <a:rPr lang="en-US" sz="1600" dirty="0" smtClean="0"/>
+              <a:t>category and so on.</a:t>
+            </a:r>
+          </a:p>
+        </p:txBody>
+      </p:sp>
+      <p:pic>
+        <p:nvPicPr>
+          <p:cNvPr id="5" name="Picture 4"/>
+          <p:cNvPicPr>
+            <a:picLocks noChangeAspect="1"/>
+          </p:cNvPicPr>
+          <p:nvPr/>
+        </p:nvPicPr>
+        <p:blipFill>
+          <a:blip r:embed="rId2"/>
+          <a:stretch>
+            <a:fillRect/>
+          </a:stretch>
+        </p:blipFill>
+        <p:spPr>
+          <a:xfrm>
+            <a:off x="321734" y="1295401"/>
+            <a:ext cx="4152283" cy="5046133"/>
+          </a:xfrm>
+          <a:prstGeom prst="rect">
+            <a:avLst/>
+          </a:prstGeom>
+          <a:ln>
+            <a:noFill/>
+          </a:ln>
+          <a:effectLst>
+            <a:outerShdw blurRad="292100" dist="139700" dir="2700000" algn="tl" rotWithShape="0">
+              <a:srgbClr val="333333">
+                <a:alpha val="65000"/>
+              </a:srgbClr>
+            </a:outerShdw>
+          </a:effectLst>
+        </p:spPr>
+      </p:pic>
+      <p:pic>
+        <p:nvPicPr>
+          <p:cNvPr id="6" name="Picture 5"/>
+          <p:cNvPicPr>
+            <a:picLocks noChangeAspect="1"/>
+          </p:cNvPicPr>
+          <p:nvPr/>
+        </p:nvPicPr>
+        <p:blipFill>
+          <a:blip r:embed="rId3"/>
+          <a:stretch>
+            <a:fillRect/>
+          </a:stretch>
+        </p:blipFill>
+        <p:spPr>
+          <a:xfrm>
+            <a:off x="8485634" y="1474968"/>
+            <a:ext cx="3558816" cy="4226093"/>
+          </a:xfrm>
+          <a:prstGeom prst="rect">
+            <a:avLst/>
+          </a:prstGeom>
+          <a:ln>
+            <a:noFill/>
+          </a:ln>
+          <a:effectLst>
+            <a:outerShdw blurRad="292100" dist="139700" dir="2700000" algn="tl" rotWithShape="0">
+              <a:srgbClr val="333333">
+                <a:alpha val="65000"/>
+              </a:srgbClr>
+            </a:outerShdw>
+          </a:effectLst>
+        </p:spPr>
+      </p:pic>
+    </p:spTree>
+    <p:extLst>
+      <p:ext uri="{BB962C8B-B14F-4D97-AF65-F5344CB8AC3E}">
+        <p14:creationId xmlns:p14="http://schemas.microsoft.com/office/powerpoint/2010/main" val="4114198444"/>
+      </p:ext>
+    </p:extLst>
+  </p:cSld>
+  <p:clrMapOvr>
+    <a:masterClrMapping/>
+  </p:clrMapOvr>
+  <p:timing>
+    <p:tnLst>
+      <p:par>
+        <p:cTn id="1" dur="indefinite" restart="never" nodeType="tmRoot"/>
+      </p:par>
+    </p:tnLst>
+  </p:timing>
+</p:sld>
+</file>
+
+<file path=ppt/slides/slide8.xml><?xml version="1.0" encoding="utf-8"?>
+<p:sld xmlns:a="http://schemas.openxmlformats.org/drawingml/2006/main" xmlns:r="http://schemas.openxmlformats.org/officeDocument/2006/relationships" xmlns:p="http://schemas.openxmlformats.org/presentationml/2006/main">
+  <p:cSld>
+    <p:spTree>
+      <p:nvGrpSpPr>
+        <p:cNvPr id="1" name=""/>
+        <p:cNvGrpSpPr/>
+        <p:nvPr/>
+      </p:nvGrpSpPr>
+      <p:grpSpPr>
+        <a:xfrm>
+          <a:off x="0" y="0"/>
+          <a:ext cx="0" cy="0"/>
+          <a:chOff x="0" y="0"/>
+          <a:chExt cx="0" cy="0"/>
+        </a:xfrm>
+      </p:grpSpPr>
+      <p:sp>
+        <p:nvSpPr>
+          <p:cNvPr id="2" name="Title 1"/>
+          <p:cNvSpPr>
+            <a:spLocks noGrp="1"/>
+          </p:cNvSpPr>
+          <p:nvPr>
+            <p:ph type="title"/>
+          </p:nvPr>
+        </p:nvSpPr>
+        <p:spPr>
+          <a:xfrm>
+            <a:off x="838200" y="365125"/>
+            <a:ext cx="10515600" cy="716915"/>
+          </a:xfrm>
+        </p:spPr>
+        <p:txBody>
+          <a:bodyPr>
+            <a:normAutofit/>
+          </a:bodyPr>
+          <a:lstStyle/>
+          <a:p>
+            <a:r>
+              <a:rPr lang="en-GB" sz="3600" dirty="0" smtClean="0"/>
+              <a:t>Step 6. </a:t>
+            </a:r>
+            <a:r>
+              <a:rPr lang="en-GB" sz="3600" dirty="0" smtClean="0">
+                <a:solidFill>
+                  <a:srgbClr val="00B050"/>
+                </a:solidFill>
+              </a:rPr>
+              <a:t>Amount, ingredients and preparation</a:t>
+            </a:r>
+            <a:r>
+              <a:rPr lang="en-GB" sz="3600" dirty="0" smtClean="0"/>
+              <a:t> section</a:t>
+            </a:r>
+            <a:endParaRPr lang="en-GB" sz="3600" dirty="0"/>
+          </a:p>
+        </p:txBody>
+      </p:sp>
+      <p:sp>
+        <p:nvSpPr>
+          <p:cNvPr id="3" name="Content Placeholder 2"/>
+          <p:cNvSpPr>
+            <a:spLocks noGrp="1"/>
+          </p:cNvSpPr>
+          <p:nvPr>
+            <p:ph sz="half" idx="1"/>
+          </p:nvPr>
+        </p:nvSpPr>
+        <p:spPr>
+          <a:xfrm>
+            <a:off x="354949" y="1082040"/>
+            <a:ext cx="4344051" cy="5094923"/>
+          </a:xfrm>
+        </p:spPr>
+        <p:txBody>
+          <a:bodyPr>
+            <a:normAutofit lnSpcReduction="10000"/>
+          </a:bodyPr>
+          <a:lstStyle/>
+          <a:p>
+            <a:pPr marL="0" indent="0">
+              <a:buNone/>
+            </a:pPr>
+            <a:r>
+              <a:rPr lang="en-GB" sz="1600" dirty="0" smtClean="0"/>
+              <a:t>Fill the following:</a:t>
+            </a:r>
+          </a:p>
+          <a:p>
+            <a:r>
+              <a:rPr lang="en-GB" sz="1600" b="1" dirty="0" smtClean="0"/>
+              <a:t>Basic info</a:t>
+            </a:r>
+            <a:r>
+              <a:rPr lang="en-GB" sz="1600" dirty="0" smtClean="0"/>
+              <a:t>: </a:t>
+            </a:r>
+          </a:p>
+          <a:p>
+            <a:pPr lvl="1"/>
+            <a:r>
+              <a:rPr lang="en-GB" sz="1200" dirty="0" smtClean="0"/>
+              <a:t>Amount, Unit and Total time</a:t>
+            </a:r>
+            <a:endParaRPr lang="en-GB" sz="1200" dirty="0"/>
+          </a:p>
+          <a:p>
+            <a:r>
+              <a:rPr lang="en-GB" sz="1600" b="1" dirty="0" smtClean="0"/>
+              <a:t>Ingredients and recipe description</a:t>
+            </a:r>
+            <a:r>
+              <a:rPr lang="en-GB" sz="1600" dirty="0" smtClean="0"/>
+              <a:t>:</a:t>
+            </a:r>
+          </a:p>
+          <a:p>
+            <a:pPr lvl="1"/>
+            <a:r>
+              <a:rPr lang="en-GB" sz="1200" dirty="0"/>
+              <a:t>T</a:t>
+            </a:r>
+            <a:r>
+              <a:rPr lang="en-GB" sz="1200" dirty="0" smtClean="0"/>
+              <a:t>o Add the ingredient click on </a:t>
+            </a:r>
+            <a:r>
+              <a:rPr lang="en-GB" sz="1200" dirty="0" smtClean="0">
+                <a:solidFill>
+                  <a:srgbClr val="00B050"/>
+                </a:solidFill>
+              </a:rPr>
+              <a:t>Add ingredient</a:t>
+            </a:r>
+            <a:r>
+              <a:rPr lang="en-GB" sz="1200" dirty="0" smtClean="0"/>
+              <a:t> button;</a:t>
+            </a:r>
+          </a:p>
+          <a:p>
+            <a:pPr lvl="1"/>
+            <a:r>
+              <a:rPr lang="en-GB" sz="1200" dirty="0" smtClean="0"/>
+              <a:t>To separate one ingredients group from another, click </a:t>
+            </a:r>
+            <a:r>
+              <a:rPr lang="en-GB" sz="1200" dirty="0" smtClean="0">
+                <a:solidFill>
+                  <a:srgbClr val="00B050"/>
+                </a:solidFill>
+              </a:rPr>
+              <a:t>Add spacing</a:t>
+            </a:r>
+            <a:r>
+              <a:rPr lang="en-GB" sz="1200" dirty="0" smtClean="0"/>
+              <a:t> button.</a:t>
+            </a:r>
+          </a:p>
+          <a:p>
+            <a:pPr lvl="1"/>
+            <a:r>
+              <a:rPr lang="en-GB" sz="1200" dirty="0" smtClean="0"/>
+              <a:t>To add the ingredients group titles click </a:t>
+            </a:r>
+            <a:r>
+              <a:rPr lang="en-GB" sz="1200" dirty="0" smtClean="0">
+                <a:solidFill>
+                  <a:srgbClr val="00B050"/>
+                </a:solidFill>
+              </a:rPr>
+              <a:t>Add group title</a:t>
+            </a:r>
+            <a:r>
+              <a:rPr lang="en-GB" sz="1200" dirty="0" smtClean="0"/>
+              <a:t>.</a:t>
+            </a:r>
+          </a:p>
+          <a:p>
+            <a:pPr lvl="1"/>
+            <a:endParaRPr lang="en-GB" sz="1200" dirty="0"/>
+          </a:p>
+          <a:p>
+            <a:pPr marL="457200" lvl="1" indent="0">
+              <a:buNone/>
+            </a:pPr>
+            <a:r>
+              <a:rPr lang="en-GB" sz="1200" dirty="0" smtClean="0"/>
+              <a:t>How to add ingredient:</a:t>
+            </a:r>
+          </a:p>
+          <a:p>
+            <a:pPr lvl="1"/>
+            <a:r>
+              <a:rPr lang="en-GB" sz="1200" dirty="0" smtClean="0"/>
+              <a:t>Click on </a:t>
+            </a:r>
+            <a:r>
+              <a:rPr lang="en-GB" sz="1200" dirty="0" smtClean="0">
+                <a:solidFill>
+                  <a:srgbClr val="00B050"/>
+                </a:solidFill>
+              </a:rPr>
+              <a:t>Add ingredient</a:t>
+            </a:r>
+            <a:r>
+              <a:rPr lang="en-GB" sz="1200" dirty="0" smtClean="0"/>
+              <a:t> button – the ingredient line has appeared;</a:t>
+            </a:r>
+          </a:p>
+          <a:p>
+            <a:pPr lvl="1"/>
+            <a:r>
+              <a:rPr lang="en-GB" sz="1200" dirty="0" smtClean="0"/>
+              <a:t>In </a:t>
+            </a:r>
+            <a:r>
+              <a:rPr lang="en-GB" sz="1200" dirty="0" smtClean="0">
+                <a:solidFill>
+                  <a:srgbClr val="00B050"/>
+                </a:solidFill>
+              </a:rPr>
+              <a:t>Ingredient</a:t>
+            </a:r>
+            <a:r>
+              <a:rPr lang="en-GB" sz="1200" dirty="0" smtClean="0"/>
+              <a:t> field start typing the ingredient name and in the autosuggestions list pick the right ingredient – the cursor will jump to </a:t>
+            </a:r>
+            <a:r>
+              <a:rPr lang="en-GB" sz="1200" dirty="0" smtClean="0">
+                <a:solidFill>
+                  <a:srgbClr val="00B050"/>
+                </a:solidFill>
+              </a:rPr>
+              <a:t>Amount &amp; Unit</a:t>
+            </a:r>
+            <a:r>
+              <a:rPr lang="en-GB" sz="1200" dirty="0" smtClean="0"/>
+              <a:t> field </a:t>
+            </a:r>
+            <a:r>
+              <a:rPr lang="en-GB" sz="1200" b="1" dirty="0" smtClean="0"/>
+              <a:t>automatically;</a:t>
+            </a:r>
+          </a:p>
+          <a:p>
+            <a:pPr lvl="1"/>
+            <a:r>
+              <a:rPr lang="en-GB" sz="1200" dirty="0" smtClean="0"/>
+              <a:t>Put the amount of the ingredient and measurement units;</a:t>
+            </a:r>
+          </a:p>
+          <a:p>
+            <a:pPr lvl="1"/>
+            <a:r>
+              <a:rPr lang="en-GB" sz="1200" dirty="0" smtClean="0"/>
+              <a:t>Prefixes and Suffix parts are needed to build the readable sentence (not mandatory).</a:t>
+            </a:r>
+          </a:p>
+          <a:p>
+            <a:pPr lvl="1"/>
+            <a:r>
+              <a:rPr lang="en-GB" sz="1200" dirty="0" smtClean="0"/>
+              <a:t>Check that </a:t>
+            </a:r>
+            <a:r>
+              <a:rPr lang="en-US" sz="1200" dirty="0" smtClean="0"/>
+              <a:t>cheese </a:t>
+            </a:r>
+            <a:r>
+              <a:rPr lang="en-US" sz="1200" dirty="0"/>
+              <a:t>names </a:t>
+            </a:r>
+            <a:r>
+              <a:rPr lang="en-US" sz="1200" dirty="0" smtClean="0"/>
+              <a:t>are starting </a:t>
+            </a:r>
+            <a:r>
+              <a:rPr lang="en-US" sz="1200" dirty="0"/>
+              <a:t>with capital letters, e.g. </a:t>
+            </a:r>
+            <a:r>
+              <a:rPr lang="en-US" sz="1200" u="sng" dirty="0"/>
+              <a:t>M</a:t>
+            </a:r>
+            <a:r>
+              <a:rPr lang="en-US" sz="1200" dirty="0"/>
+              <a:t>ature </a:t>
+            </a:r>
+            <a:r>
+              <a:rPr lang="en-US" sz="1200" u="sng" dirty="0"/>
+              <a:t>C</a:t>
+            </a:r>
+            <a:r>
+              <a:rPr lang="en-US" sz="1200" dirty="0"/>
+              <a:t>heddar</a:t>
+            </a:r>
+            <a:endParaRPr lang="en-GB" sz="1200" dirty="0" smtClean="0"/>
+          </a:p>
+          <a:p>
+            <a:r>
+              <a:rPr lang="en-GB" sz="1600" dirty="0" smtClean="0"/>
+              <a:t>Don’t forget to </a:t>
+            </a:r>
+            <a:r>
+              <a:rPr lang="en-GB" sz="1600" dirty="0" smtClean="0">
+                <a:solidFill>
+                  <a:srgbClr val="00B050"/>
+                </a:solidFill>
+              </a:rPr>
+              <a:t>Save</a:t>
+            </a:r>
+            <a:r>
+              <a:rPr lang="en-GB" sz="1600" dirty="0" smtClean="0"/>
+              <a:t> your changes time to time.</a:t>
+            </a:r>
+          </a:p>
+        </p:txBody>
+      </p:sp>
+      <p:pic>
+        <p:nvPicPr>
+          <p:cNvPr id="5" name="Content Placeholder 4"/>
+          <p:cNvPicPr>
+            <a:picLocks noGrp="1" noChangeAspect="1"/>
+          </p:cNvPicPr>
+          <p:nvPr>
+            <p:ph sz="half" idx="2"/>
+          </p:nvPr>
+        </p:nvPicPr>
+        <p:blipFill>
+          <a:blip r:embed="rId2"/>
+          <a:stretch>
+            <a:fillRect/>
+          </a:stretch>
+        </p:blipFill>
+        <p:spPr>
+          <a:xfrm>
+            <a:off x="5739001" y="1082040"/>
+            <a:ext cx="5809532" cy="1915160"/>
+          </a:xfrm>
+          <a:prstGeom prst="rect">
+            <a:avLst/>
+          </a:prstGeom>
+          <a:ln>
+            <a:noFill/>
+          </a:ln>
+          <a:effectLst>
+            <a:outerShdw blurRad="292100" dist="139700" dir="2700000" algn="tl" rotWithShape="0">
+              <a:srgbClr val="333333">
+                <a:alpha val="65000"/>
+              </a:srgbClr>
+            </a:outerShdw>
+          </a:effectLst>
+        </p:spPr>
+      </p:pic>
+      <p:pic>
+        <p:nvPicPr>
+          <p:cNvPr id="7" name="Picture 6"/>
+          <p:cNvPicPr>
+            <a:picLocks noChangeAspect="1"/>
+          </p:cNvPicPr>
+          <p:nvPr/>
+        </p:nvPicPr>
+        <p:blipFill>
+          <a:blip r:embed="rId3"/>
+          <a:stretch>
+            <a:fillRect/>
+          </a:stretch>
+        </p:blipFill>
+        <p:spPr>
+          <a:xfrm>
+            <a:off x="4985984" y="3336777"/>
+            <a:ext cx="6765749" cy="2799198"/>
+          </a:xfrm>
+          <a:prstGeom prst="rect">
+            <a:avLst/>
+          </a:prstGeom>
+          <a:ln>
+            <a:noFill/>
+          </a:ln>
+          <a:effectLst>
+            <a:outerShdw blurRad="292100" dist="139700" dir="2700000" algn="tl" rotWithShape="0">
+              <a:srgbClr val="333333">
+                <a:alpha val="65000"/>
+              </a:srgbClr>
+            </a:outerShdw>
+          </a:effectLst>
+        </p:spPr>
+      </p:pic>
     </p:spTree>
     <p:extLst>
       <p:ext uri="{BB962C8B-B14F-4D97-AF65-F5344CB8AC3E}">
         <p14:creationId xmlns:p14="http://schemas.microsoft.com/office/powerpoint/2010/main" val="3790658775"/>
+      </p:ext>
+    </p:extLst>
+  </p:cSld>
+  <p:clrMapOvr>
+    <a:masterClrMapping/>
+  </p:clrMapOvr>
+  <p:timing>
+    <p:tnLst>
+      <p:par>
+        <p:cTn id="1" dur="indefinite" restart="never" nodeType="tmRoot"/>
+      </p:par>
+    </p:tnLst>
+  </p:timing>
+</p:sld>
+</file>
+
+<file path=ppt/slides/slide9.xml><?xml version="1.0" encoding="utf-8"?>
+<p:sld xmlns:a="http://schemas.openxmlformats.org/drawingml/2006/main" xmlns:r="http://schemas.openxmlformats.org/officeDocument/2006/relationships" xmlns:p="http://schemas.openxmlformats.org/presentationml/2006/main">
+  <p:cSld>
+    <p:spTree>
+      <p:nvGrpSpPr>
+        <p:cNvPr id="1" name=""/>
+        <p:cNvGrpSpPr/>
+        <p:nvPr/>
+      </p:nvGrpSpPr>
+      <p:grpSpPr>
+        <a:xfrm>
+          <a:off x="0" y="0"/>
+          <a:ext cx="0" cy="0"/>
+          <a:chOff x="0" y="0"/>
+          <a:chExt cx="0" cy="0"/>
+        </a:xfrm>
+      </p:grpSpPr>
+      <p:sp>
+        <p:nvSpPr>
+          <p:cNvPr id="2" name="Title 1"/>
+          <p:cNvSpPr>
+            <a:spLocks noGrp="1"/>
+          </p:cNvSpPr>
+          <p:nvPr>
+            <p:ph type="title"/>
+          </p:nvPr>
+        </p:nvSpPr>
+        <p:spPr>
+          <a:xfrm>
+            <a:off x="584201" y="365126"/>
+            <a:ext cx="11209866" cy="566208"/>
+          </a:xfrm>
+        </p:spPr>
+        <p:txBody>
+          <a:bodyPr>
+            <a:normAutofit fontScale="90000"/>
+          </a:bodyPr>
+          <a:lstStyle/>
+          <a:p>
+            <a:r>
+              <a:rPr lang="en-GB" sz="3600" dirty="0">
+                <a:solidFill>
+                  <a:prstClr val="black"/>
+                </a:solidFill>
+              </a:rPr>
+              <a:t>Step 6. </a:t>
+            </a:r>
+            <a:r>
+              <a:rPr lang="en-GB" sz="3600" dirty="0">
+                <a:solidFill>
+                  <a:srgbClr val="00B050"/>
+                </a:solidFill>
+              </a:rPr>
+              <a:t>Amount, ingredients and </a:t>
+            </a:r>
+            <a:r>
+              <a:rPr lang="en-GB" sz="3600" dirty="0" smtClean="0">
+                <a:solidFill>
+                  <a:srgbClr val="00B050"/>
+                </a:solidFill>
+              </a:rPr>
+              <a:t>preparation</a:t>
+            </a:r>
+            <a:r>
+              <a:rPr lang="en-GB" sz="3600" dirty="0" smtClean="0">
+                <a:solidFill>
+                  <a:prstClr val="black"/>
+                </a:solidFill>
+              </a:rPr>
+              <a:t>. </a:t>
+            </a:r>
+            <a:r>
+              <a:rPr lang="en-GB" sz="3600" b="1" dirty="0" smtClean="0">
+                <a:solidFill>
+                  <a:prstClr val="black"/>
+                </a:solidFill>
+              </a:rPr>
+              <a:t>Cooking instructions</a:t>
+            </a:r>
+            <a:endParaRPr lang="uk-UA" b="1" dirty="0"/>
+          </a:p>
+        </p:txBody>
+      </p:sp>
+      <p:sp>
+        <p:nvSpPr>
+          <p:cNvPr id="3" name="Content Placeholder 2"/>
+          <p:cNvSpPr>
+            <a:spLocks noGrp="1"/>
+          </p:cNvSpPr>
+          <p:nvPr>
+            <p:ph sz="half" idx="1"/>
+          </p:nvPr>
+        </p:nvSpPr>
+        <p:spPr>
+          <a:xfrm>
+            <a:off x="838200" y="931334"/>
+            <a:ext cx="5181600" cy="5245629"/>
+          </a:xfrm>
+        </p:spPr>
+        <p:txBody>
+          <a:bodyPr>
+            <a:normAutofit/>
+          </a:bodyPr>
+          <a:lstStyle/>
+          <a:p>
+            <a:pPr marL="0" indent="0">
+              <a:buNone/>
+            </a:pPr>
+            <a:r>
+              <a:rPr lang="en-US" sz="1600" b="1" dirty="0" smtClean="0"/>
+              <a:t>Cooking instructions</a:t>
+            </a:r>
+            <a:r>
+              <a:rPr lang="en-US" sz="1600" dirty="0"/>
+              <a:t>: </a:t>
+            </a:r>
+            <a:endParaRPr lang="en-US" sz="1600" dirty="0" smtClean="0"/>
+          </a:p>
+          <a:p>
+            <a:endParaRPr lang="en-US" sz="1600" dirty="0" smtClean="0"/>
+          </a:p>
+          <a:p>
+            <a:r>
+              <a:rPr lang="en-US" sz="1600" dirty="0" smtClean="0"/>
+              <a:t>the first cooking instructions section goes as an intro to the preparation process;</a:t>
+            </a:r>
+            <a:endParaRPr lang="en-US" sz="1600" dirty="0"/>
+          </a:p>
+          <a:p>
+            <a:r>
+              <a:rPr lang="en-US" sz="1600" dirty="0" smtClean="0"/>
+              <a:t>each </a:t>
+            </a:r>
+            <a:r>
+              <a:rPr lang="en-US" sz="1600" dirty="0"/>
+              <a:t>step of the </a:t>
+            </a:r>
+            <a:r>
+              <a:rPr lang="en-US" sz="1600" dirty="0" smtClean="0"/>
+              <a:t>recipe should </a:t>
+            </a:r>
+            <a:r>
+              <a:rPr lang="en-US" sz="1600" dirty="0"/>
+              <a:t>be created in its own group and that it should be </a:t>
+            </a:r>
+            <a:r>
+              <a:rPr lang="en-US" sz="1600" dirty="0" smtClean="0"/>
+              <a:t>numbered;</a:t>
+            </a:r>
+          </a:p>
+          <a:p>
+            <a:r>
+              <a:rPr lang="en-US" sz="1600" dirty="0" smtClean="0"/>
+              <a:t>the cooking instructions titles are not shown on the website, so they could be skipped;</a:t>
+            </a:r>
+          </a:p>
+          <a:p>
+            <a:r>
+              <a:rPr lang="en-US" sz="1600" dirty="0" smtClean="0"/>
+              <a:t>right after the list of instructions the additional groups could be added also.</a:t>
+            </a:r>
+          </a:p>
+          <a:p>
+            <a:pPr marL="0" indent="0">
+              <a:buNone/>
+            </a:pPr>
+            <a:r>
+              <a:rPr lang="en-US" sz="1600" dirty="0"/>
+              <a:t>See example here: </a:t>
+            </a:r>
+            <a:r>
+              <a:rPr lang="en-US" sz="1600" dirty="0">
+                <a:hlinkClick r:id="rId2"/>
+              </a:rPr>
+              <a:t>https://www.castellocheese.com/en-gb/recipes/creamy-macaroni-cheese</a:t>
+            </a:r>
+            <a:r>
+              <a:rPr lang="en-US" sz="1600" dirty="0" smtClean="0">
+                <a:hlinkClick r:id="rId2"/>
+              </a:rPr>
+              <a:t>/</a:t>
+            </a:r>
+            <a:endParaRPr lang="en-US" sz="1600" dirty="0" smtClean="0"/>
+          </a:p>
+          <a:p>
+            <a:pPr marL="0" indent="0">
+              <a:buNone/>
+            </a:pPr>
+            <a:endParaRPr lang="uk-UA" sz="1600" dirty="0"/>
+          </a:p>
+        </p:txBody>
+      </p:sp>
+      <p:sp>
+        <p:nvSpPr>
+          <p:cNvPr id="4" name="Content Placeholder 3"/>
+          <p:cNvSpPr>
+            <a:spLocks noGrp="1"/>
+          </p:cNvSpPr>
+          <p:nvPr>
+            <p:ph sz="half" idx="2"/>
+          </p:nvPr>
+        </p:nvSpPr>
+        <p:spPr>
+          <a:xfrm>
+            <a:off x="6172200" y="931334"/>
+            <a:ext cx="5181600" cy="5245629"/>
+          </a:xfrm>
+        </p:spPr>
+        <p:txBody>
+          <a:bodyPr/>
+          <a:lstStyle/>
+          <a:p>
+            <a:endParaRPr lang="uk-UA" dirty="0"/>
+          </a:p>
+        </p:txBody>
+      </p:sp>
+      <p:pic>
+        <p:nvPicPr>
+          <p:cNvPr id="5" name="Picture 4"/>
+          <p:cNvPicPr>
+            <a:picLocks noChangeAspect="1"/>
+          </p:cNvPicPr>
+          <p:nvPr/>
+        </p:nvPicPr>
+        <p:blipFill>
+          <a:blip r:embed="rId3"/>
+          <a:stretch>
+            <a:fillRect/>
+          </a:stretch>
+        </p:blipFill>
+        <p:spPr>
+          <a:xfrm>
+            <a:off x="6172199" y="931334"/>
+            <a:ext cx="4453467" cy="5247078"/>
+          </a:xfrm>
+          <a:prstGeom prst="rect">
+            <a:avLst/>
+          </a:prstGeom>
+          <a:ln>
+            <a:noFill/>
+          </a:ln>
+          <a:effectLst>
+            <a:outerShdw blurRad="292100" dist="139700" dir="2700000" algn="tl" rotWithShape="0">
+              <a:srgbClr val="333333">
+                <a:alpha val="65000"/>
+              </a:srgbClr>
+            </a:outerShdw>
+          </a:effectLst>
+        </p:spPr>
+      </p:pic>
+    </p:spTree>
+    <p:extLst>
+      <p:ext uri="{BB962C8B-B14F-4D97-AF65-F5344CB8AC3E}">
+        <p14:creationId xmlns:p14="http://schemas.microsoft.com/office/powerpoint/2010/main" val="3905787"/>
       </p:ext>
     </p:extLst>
   </p:cSld>

</xml_diff>